<commit_message>
Actualizacion de comentarios y presentacion
</commit_message>
<xml_diff>
--- a/documentos/Presentacion.pptx
+++ b/documentos/Presentacion.pptx
@@ -111,6 +111,11 @@
       </a:defRPr>
     </a:lvl9pPr>
   </p:defaultTextStyle>
+  <p:extLst>
+    <p:ext uri="{EFAFB233-063F-42B5-8137-9DF3F51BA10A}">
+      <p15:sldGuideLst xmlns:p15="http://schemas.microsoft.com/office/powerpoint/2012/main"/>
+    </p:ext>
+  </p:extLst>
 </p:presentation>
 </file>
 
@@ -171,7 +176,7 @@
           <a:noFill/>
           <a:extLst>
             <a:ext uri="{909E8E84-426E-40dd-AFC4-6F175D3DCCD1}">
-              <a14:hiddenFill xmlns:a14="http://schemas.microsoft.com/office/drawing/2010/main" xmlns="">
+              <a14:hiddenFill xmlns="" xmlns:a14="http://schemas.microsoft.com/office/drawing/2010/main">
                 <a:solidFill>
                   <a:srgbClr val="FFFFFF"/>
                 </a:solidFill>
@@ -230,7 +235,7 @@
             </a:ln>
             <a:extLst>
               <a:ext uri="{91240B29-F687-4f45-9708-019B960494DF}">
-                <a14:hiddenLine xmlns:a14="http://schemas.microsoft.com/office/drawing/2010/main" xmlns="" w="9525">
+                <a14:hiddenLine xmlns="" xmlns:a14="http://schemas.microsoft.com/office/drawing/2010/main" w="9525">
                   <a:solidFill>
                     <a:srgbClr val="000000"/>
                   </a:solidFill>
@@ -320,7 +325,7 @@
             </a:ln>
             <a:extLst>
               <a:ext uri="{91240B29-F687-4f45-9708-019B960494DF}">
-                <a14:hiddenLine xmlns:a14="http://schemas.microsoft.com/office/drawing/2010/main" xmlns="" w="9525">
+                <a14:hiddenLine xmlns="" xmlns:a14="http://schemas.microsoft.com/office/drawing/2010/main" w="9525">
                   <a:solidFill>
                     <a:srgbClr val="000000"/>
                   </a:solidFill>
@@ -410,7 +415,7 @@
             </a:ln>
             <a:extLst>
               <a:ext uri="{91240B29-F687-4f45-9708-019B960494DF}">
-                <a14:hiddenLine xmlns:a14="http://schemas.microsoft.com/office/drawing/2010/main" xmlns="" w="9525">
+                <a14:hiddenLine xmlns="" xmlns:a14="http://schemas.microsoft.com/office/drawing/2010/main" w="9525">
                   <a:solidFill>
                     <a:srgbClr val="000000"/>
                   </a:solidFill>
@@ -444,7 +449,7 @@
             </a:ln>
             <a:extLst>
               <a:ext uri="{91240B29-F687-4f45-9708-019B960494DF}">
-                <a14:hiddenLine xmlns:a14="http://schemas.microsoft.com/office/drawing/2010/main" xmlns="" w="9525">
+                <a14:hiddenLine xmlns="" xmlns:a14="http://schemas.microsoft.com/office/drawing/2010/main" w="9525">
                   <a:solidFill>
                     <a:srgbClr val="000000"/>
                   </a:solidFill>
@@ -534,7 +539,7 @@
             </a:ln>
             <a:extLst>
               <a:ext uri="{91240B29-F687-4f45-9708-019B960494DF}">
-                <a14:hiddenLine xmlns:a14="http://schemas.microsoft.com/office/drawing/2010/main" xmlns="" w="9525">
+                <a14:hiddenLine xmlns="" xmlns:a14="http://schemas.microsoft.com/office/drawing/2010/main" w="9525">
                   <a:solidFill>
                     <a:srgbClr val="000000"/>
                   </a:solidFill>
@@ -596,7 +601,7 @@
             </a:ln>
             <a:extLst>
               <a:ext uri="{91240B29-F687-4f45-9708-019B960494DF}">
-                <a14:hiddenLine xmlns:a14="http://schemas.microsoft.com/office/drawing/2010/main" xmlns="" w="9525">
+                <a14:hiddenLine xmlns="" xmlns:a14="http://schemas.microsoft.com/office/drawing/2010/main" w="9525">
                   <a:solidFill>
                     <a:srgbClr val="000000"/>
                   </a:solidFill>
@@ -658,7 +663,7 @@
             </a:ln>
             <a:extLst>
               <a:ext uri="{91240B29-F687-4f45-9708-019B960494DF}">
-                <a14:hiddenLine xmlns:a14="http://schemas.microsoft.com/office/drawing/2010/main" xmlns="" w="9525">
+                <a14:hiddenLine xmlns="" xmlns:a14="http://schemas.microsoft.com/office/drawing/2010/main" w="9525">
                   <a:solidFill>
                     <a:srgbClr val="000000"/>
                   </a:solidFill>
@@ -748,7 +753,7 @@
             </a:ln>
             <a:extLst>
               <a:ext uri="{91240B29-F687-4f45-9708-019B960494DF}">
-                <a14:hiddenLine xmlns:a14="http://schemas.microsoft.com/office/drawing/2010/main" xmlns="" w="9525">
+                <a14:hiddenLine xmlns="" xmlns:a14="http://schemas.microsoft.com/office/drawing/2010/main" w="9525">
                   <a:solidFill>
                     <a:srgbClr val="000000"/>
                   </a:solidFill>
@@ -810,7 +815,7 @@
             </a:ln>
             <a:extLst>
               <a:ext uri="{91240B29-F687-4f45-9708-019B960494DF}">
-                <a14:hiddenLine xmlns:a14="http://schemas.microsoft.com/office/drawing/2010/main" xmlns="" w="9525">
+                <a14:hiddenLine xmlns="" xmlns:a14="http://schemas.microsoft.com/office/drawing/2010/main" w="9525">
                   <a:solidFill>
                     <a:srgbClr val="000000"/>
                   </a:solidFill>
@@ -872,7 +877,7 @@
             </a:ln>
             <a:extLst>
               <a:ext uri="{91240B29-F687-4f45-9708-019B960494DF}">
-                <a14:hiddenLine xmlns:a14="http://schemas.microsoft.com/office/drawing/2010/main" xmlns="" w="9525">
+                <a14:hiddenLine xmlns="" xmlns:a14="http://schemas.microsoft.com/office/drawing/2010/main" w="9525">
                   <a:solidFill>
                     <a:srgbClr val="000000"/>
                   </a:solidFill>
@@ -962,7 +967,7 @@
             </a:ln>
             <a:extLst>
               <a:ext uri="{91240B29-F687-4f45-9708-019B960494DF}">
-                <a14:hiddenLine xmlns:a14="http://schemas.microsoft.com/office/drawing/2010/main" xmlns="" w="9525">
+                <a14:hiddenLine xmlns="" xmlns:a14="http://schemas.microsoft.com/office/drawing/2010/main" w="9525">
                   <a:solidFill>
                     <a:srgbClr val="000000"/>
                   </a:solidFill>
@@ -1052,7 +1057,7 @@
             </a:ln>
             <a:extLst>
               <a:ext uri="{91240B29-F687-4f45-9708-019B960494DF}">
-                <a14:hiddenLine xmlns:a14="http://schemas.microsoft.com/office/drawing/2010/main" xmlns="" w="9525">
+                <a14:hiddenLine xmlns="" xmlns:a14="http://schemas.microsoft.com/office/drawing/2010/main" w="9525">
                   <a:solidFill>
                     <a:srgbClr val="000000"/>
                   </a:solidFill>
@@ -1114,7 +1119,7 @@
             </a:ln>
             <a:extLst>
               <a:ext uri="{91240B29-F687-4f45-9708-019B960494DF}">
-                <a14:hiddenLine xmlns:a14="http://schemas.microsoft.com/office/drawing/2010/main" xmlns="" w="9525">
+                <a14:hiddenLine xmlns="" xmlns:a14="http://schemas.microsoft.com/office/drawing/2010/main" w="9525">
                   <a:solidFill>
                     <a:srgbClr val="000000"/>
                   </a:solidFill>
@@ -1224,7 +1229,7 @@
             </a:ln>
             <a:extLst>
               <a:ext uri="{91240B29-F687-4f45-9708-019B960494DF}">
-                <a14:hiddenLine xmlns:a14="http://schemas.microsoft.com/office/drawing/2010/main" xmlns="" w="9525">
+                <a14:hiddenLine xmlns="" xmlns:a14="http://schemas.microsoft.com/office/drawing/2010/main" w="9525">
                   <a:solidFill>
                     <a:srgbClr val="000000"/>
                   </a:solidFill>
@@ -1286,7 +1291,7 @@
             </a:ln>
             <a:extLst>
               <a:ext uri="{91240B29-F687-4f45-9708-019B960494DF}">
-                <a14:hiddenLine xmlns:a14="http://schemas.microsoft.com/office/drawing/2010/main" xmlns="" w="9525">
+                <a14:hiddenLine xmlns="" xmlns:a14="http://schemas.microsoft.com/office/drawing/2010/main" w="9525">
                   <a:solidFill>
                     <a:srgbClr val="000000"/>
                   </a:solidFill>
@@ -1376,7 +1381,7 @@
             </a:ln>
             <a:extLst>
               <a:ext uri="{91240B29-F687-4f45-9708-019B960494DF}">
-                <a14:hiddenLine xmlns:a14="http://schemas.microsoft.com/office/drawing/2010/main" xmlns="" w="9525">
+                <a14:hiddenLine xmlns="" xmlns:a14="http://schemas.microsoft.com/office/drawing/2010/main" w="9525">
                   <a:solidFill>
                     <a:srgbClr val="000000"/>
                   </a:solidFill>
@@ -1466,7 +1471,7 @@
             </a:ln>
             <a:extLst>
               <a:ext uri="{91240B29-F687-4f45-9708-019B960494DF}">
-                <a14:hiddenLine xmlns:a14="http://schemas.microsoft.com/office/drawing/2010/main" xmlns="" w="9525">
+                <a14:hiddenLine xmlns="" xmlns:a14="http://schemas.microsoft.com/office/drawing/2010/main" w="9525">
                   <a:solidFill>
                     <a:srgbClr val="000000"/>
                   </a:solidFill>
@@ -1528,7 +1533,7 @@
             </a:ln>
             <a:extLst>
               <a:ext uri="{91240B29-F687-4f45-9708-019B960494DF}">
-                <a14:hiddenLine xmlns:a14="http://schemas.microsoft.com/office/drawing/2010/main" xmlns="" w="9525">
+                <a14:hiddenLine xmlns="" xmlns:a14="http://schemas.microsoft.com/office/drawing/2010/main" w="9525">
                   <a:solidFill>
                     <a:srgbClr val="000000"/>
                   </a:solidFill>
@@ -1618,7 +1623,7 @@
             </a:ln>
             <a:extLst>
               <a:ext uri="{91240B29-F687-4f45-9708-019B960494DF}">
-                <a14:hiddenLine xmlns:a14="http://schemas.microsoft.com/office/drawing/2010/main" xmlns="" w="9525">
+                <a14:hiddenLine xmlns="" xmlns:a14="http://schemas.microsoft.com/office/drawing/2010/main" w="9525">
                   <a:solidFill>
                     <a:srgbClr val="000000"/>
                   </a:solidFill>
@@ -1708,7 +1713,7 @@
             </a:ln>
             <a:extLst>
               <a:ext uri="{91240B29-F687-4f45-9708-019B960494DF}">
-                <a14:hiddenLine xmlns:a14="http://schemas.microsoft.com/office/drawing/2010/main" xmlns="" w="9525">
+                <a14:hiddenLine xmlns="" xmlns:a14="http://schemas.microsoft.com/office/drawing/2010/main" w="9525">
                   <a:solidFill>
                     <a:srgbClr val="000000"/>
                   </a:solidFill>
@@ -1764,7 +1769,7 @@
             </a:ln>
             <a:extLst>
               <a:ext uri="{91240B29-F687-4f45-9708-019B960494DF}">
-                <a14:hiddenLine xmlns:a14="http://schemas.microsoft.com/office/drawing/2010/main" xmlns="" w="9525">
+                <a14:hiddenLine xmlns="" xmlns:a14="http://schemas.microsoft.com/office/drawing/2010/main" w="9525">
                   <a:solidFill>
                     <a:srgbClr val="000000"/>
                   </a:solidFill>
@@ -1854,7 +1859,7 @@
             </a:ln>
             <a:extLst>
               <a:ext uri="{91240B29-F687-4f45-9708-019B960494DF}">
-                <a14:hiddenLine xmlns:a14="http://schemas.microsoft.com/office/drawing/2010/main" xmlns="" w="9525">
+                <a14:hiddenLine xmlns="" xmlns:a14="http://schemas.microsoft.com/office/drawing/2010/main" w="9525">
                   <a:solidFill>
                     <a:srgbClr val="000000"/>
                   </a:solidFill>
@@ -1910,7 +1915,7 @@
             </a:ln>
             <a:extLst>
               <a:ext uri="{91240B29-F687-4f45-9708-019B960494DF}">
-                <a14:hiddenLine xmlns:a14="http://schemas.microsoft.com/office/drawing/2010/main" xmlns="" w="9525">
+                <a14:hiddenLine xmlns="" xmlns:a14="http://schemas.microsoft.com/office/drawing/2010/main" w="9525">
                   <a:solidFill>
                     <a:srgbClr val="000000"/>
                   </a:solidFill>
@@ -2000,7 +2005,7 @@
             </a:ln>
             <a:extLst>
               <a:ext uri="{91240B29-F687-4f45-9708-019B960494DF}">
-                <a14:hiddenLine xmlns:a14="http://schemas.microsoft.com/office/drawing/2010/main" xmlns="" w="9525">
+                <a14:hiddenLine xmlns="" xmlns:a14="http://schemas.microsoft.com/office/drawing/2010/main" w="9525">
                   <a:solidFill>
                     <a:srgbClr val="000000"/>
                   </a:solidFill>
@@ -2068,7 +2073,7 @@
             </a:ln>
             <a:extLst>
               <a:ext uri="{91240B29-F687-4f45-9708-019B960494DF}">
-                <a14:hiddenLine xmlns:a14="http://schemas.microsoft.com/office/drawing/2010/main" xmlns="" w="9525">
+                <a14:hiddenLine xmlns="" xmlns:a14="http://schemas.microsoft.com/office/drawing/2010/main" w="9525">
                   <a:solidFill>
                     <a:srgbClr val="000000"/>
                   </a:solidFill>
@@ -2158,7 +2163,7 @@
             </a:ln>
             <a:extLst>
               <a:ext uri="{91240B29-F687-4f45-9708-019B960494DF}">
-                <a14:hiddenLine xmlns:a14="http://schemas.microsoft.com/office/drawing/2010/main" xmlns="" w="9525">
+                <a14:hiddenLine xmlns="" xmlns:a14="http://schemas.microsoft.com/office/drawing/2010/main" w="9525">
                   <a:solidFill>
                     <a:srgbClr val="000000"/>
                   </a:solidFill>
@@ -2226,7 +2231,7 @@
             </a:ln>
             <a:extLst>
               <a:ext uri="{91240B29-F687-4f45-9708-019B960494DF}">
-                <a14:hiddenLine xmlns:a14="http://schemas.microsoft.com/office/drawing/2010/main" xmlns="" w="9525">
+                <a14:hiddenLine xmlns="" xmlns:a14="http://schemas.microsoft.com/office/drawing/2010/main" w="9525">
                   <a:solidFill>
                     <a:srgbClr val="000000"/>
                   </a:solidFill>
@@ -2316,7 +2321,7 @@
             </a:ln>
             <a:extLst>
               <a:ext uri="{91240B29-F687-4f45-9708-019B960494DF}">
-                <a14:hiddenLine xmlns:a14="http://schemas.microsoft.com/office/drawing/2010/main" xmlns="" w="9525">
+                <a14:hiddenLine xmlns="" xmlns:a14="http://schemas.microsoft.com/office/drawing/2010/main" w="9525">
                   <a:solidFill>
                     <a:srgbClr val="000000"/>
                   </a:solidFill>
@@ -2350,7 +2355,7 @@
             </a:ln>
             <a:extLst>
               <a:ext uri="{91240B29-F687-4f45-9708-019B960494DF}">
-                <a14:hiddenLine xmlns:a14="http://schemas.microsoft.com/office/drawing/2010/main" xmlns="" w="9525">
+                <a14:hiddenLine xmlns="" xmlns:a14="http://schemas.microsoft.com/office/drawing/2010/main" w="9525">
                   <a:solidFill>
                     <a:srgbClr val="000000"/>
                   </a:solidFill>
@@ -2440,7 +2445,7 @@
             </a:ln>
             <a:extLst>
               <a:ext uri="{91240B29-F687-4f45-9708-019B960494DF}">
-                <a14:hiddenLine xmlns:a14="http://schemas.microsoft.com/office/drawing/2010/main" xmlns="" w="9525">
+                <a14:hiddenLine xmlns="" xmlns:a14="http://schemas.microsoft.com/office/drawing/2010/main" w="9525">
                   <a:solidFill>
                     <a:srgbClr val="000000"/>
                   </a:solidFill>
@@ -2502,7 +2507,7 @@
             </a:ln>
             <a:extLst>
               <a:ext uri="{91240B29-F687-4f45-9708-019B960494DF}">
-                <a14:hiddenLine xmlns:a14="http://schemas.microsoft.com/office/drawing/2010/main" xmlns="" w="9525">
+                <a14:hiddenLine xmlns="" xmlns:a14="http://schemas.microsoft.com/office/drawing/2010/main" w="9525">
                   <a:solidFill>
                     <a:srgbClr val="000000"/>
                   </a:solidFill>
@@ -2564,7 +2569,7 @@
             </a:ln>
             <a:extLst>
               <a:ext uri="{91240B29-F687-4f45-9708-019B960494DF}">
-                <a14:hiddenLine xmlns:a14="http://schemas.microsoft.com/office/drawing/2010/main" xmlns="" w="9525">
+                <a14:hiddenLine xmlns="" xmlns:a14="http://schemas.microsoft.com/office/drawing/2010/main" w="9525">
                   <a:solidFill>
                     <a:srgbClr val="000000"/>
                   </a:solidFill>
@@ -2654,7 +2659,7 @@
             </a:ln>
             <a:extLst>
               <a:ext uri="{91240B29-F687-4f45-9708-019B960494DF}">
-                <a14:hiddenLine xmlns:a14="http://schemas.microsoft.com/office/drawing/2010/main" xmlns="" w="9525">
+                <a14:hiddenLine xmlns="" xmlns:a14="http://schemas.microsoft.com/office/drawing/2010/main" w="9525">
                   <a:solidFill>
                     <a:srgbClr val="000000"/>
                   </a:solidFill>
@@ -2722,7 +2727,7 @@
             </a:ln>
             <a:extLst>
               <a:ext uri="{91240B29-F687-4f45-9708-019B960494DF}">
-                <a14:hiddenLine xmlns:a14="http://schemas.microsoft.com/office/drawing/2010/main" xmlns="" w="9525">
+                <a14:hiddenLine xmlns="" xmlns:a14="http://schemas.microsoft.com/office/drawing/2010/main" w="9525">
                   <a:solidFill>
                     <a:srgbClr val="000000"/>
                   </a:solidFill>
@@ -2784,7 +2789,7 @@
             </a:ln>
             <a:extLst>
               <a:ext uri="{91240B29-F687-4f45-9708-019B960494DF}">
-                <a14:hiddenLine xmlns:a14="http://schemas.microsoft.com/office/drawing/2010/main" xmlns="" w="9525">
+                <a14:hiddenLine xmlns="" xmlns:a14="http://schemas.microsoft.com/office/drawing/2010/main" w="9525">
                   <a:solidFill>
                     <a:srgbClr val="000000"/>
                   </a:solidFill>
@@ -2874,7 +2879,7 @@
             </a:ln>
             <a:extLst>
               <a:ext uri="{91240B29-F687-4f45-9708-019B960494DF}">
-                <a14:hiddenLine xmlns:a14="http://schemas.microsoft.com/office/drawing/2010/main" xmlns="" w="9525">
+                <a14:hiddenLine xmlns="" xmlns:a14="http://schemas.microsoft.com/office/drawing/2010/main" w="9525">
                   <a:solidFill>
                     <a:srgbClr val="000000"/>
                   </a:solidFill>
@@ -2936,7 +2941,7 @@
             </a:ln>
             <a:extLst>
               <a:ext uri="{91240B29-F687-4f45-9708-019B960494DF}">
-                <a14:hiddenLine xmlns:a14="http://schemas.microsoft.com/office/drawing/2010/main" xmlns="" w="9525">
+                <a14:hiddenLine xmlns="" xmlns:a14="http://schemas.microsoft.com/office/drawing/2010/main" w="9525">
                   <a:solidFill>
                     <a:srgbClr val="000000"/>
                   </a:solidFill>
@@ -3026,7 +3031,7 @@
             </a:ln>
             <a:extLst>
               <a:ext uri="{91240B29-F687-4f45-9708-019B960494DF}">
-                <a14:hiddenLine xmlns:a14="http://schemas.microsoft.com/office/drawing/2010/main" xmlns="" w="9525">
+                <a14:hiddenLine xmlns="" xmlns:a14="http://schemas.microsoft.com/office/drawing/2010/main" w="9525">
                   <a:solidFill>
                     <a:srgbClr val="000000"/>
                   </a:solidFill>
@@ -3088,7 +3093,7 @@
             </a:ln>
             <a:extLst>
               <a:ext uri="{91240B29-F687-4f45-9708-019B960494DF}">
-                <a14:hiddenLine xmlns:a14="http://schemas.microsoft.com/office/drawing/2010/main" xmlns="" w="9525">
+                <a14:hiddenLine xmlns="" xmlns:a14="http://schemas.microsoft.com/office/drawing/2010/main" w="9525">
                   <a:solidFill>
                     <a:srgbClr val="000000"/>
                   </a:solidFill>
@@ -3178,7 +3183,7 @@
             </a:ln>
             <a:extLst>
               <a:ext uri="{91240B29-F687-4f45-9708-019B960494DF}">
-                <a14:hiddenLine xmlns:a14="http://schemas.microsoft.com/office/drawing/2010/main" xmlns="" w="9525">
+                <a14:hiddenLine xmlns="" xmlns:a14="http://schemas.microsoft.com/office/drawing/2010/main" w="9525">
                   <a:solidFill>
                     <a:srgbClr val="000000"/>
                   </a:solidFill>
@@ -3212,7 +3217,7 @@
             </a:ln>
             <a:extLst>
               <a:ext uri="{91240B29-F687-4f45-9708-019B960494DF}">
-                <a14:hiddenLine xmlns:a14="http://schemas.microsoft.com/office/drawing/2010/main" xmlns="" w="9525">
+                <a14:hiddenLine xmlns="" xmlns:a14="http://schemas.microsoft.com/office/drawing/2010/main" w="9525">
                   <a:solidFill>
                     <a:srgbClr val="000000"/>
                   </a:solidFill>
@@ -3277,7 +3282,7 @@
             </a:ln>
             <a:extLst>
               <a:ext uri="{91240B29-F687-4f45-9708-019B960494DF}">
-                <a14:hiddenLine xmlns:a14="http://schemas.microsoft.com/office/drawing/2010/main" xmlns="" w="9525">
+                <a14:hiddenLine xmlns="" xmlns:a14="http://schemas.microsoft.com/office/drawing/2010/main" w="9525">
                   <a:solidFill>
                     <a:srgbClr val="000000"/>
                   </a:solidFill>
@@ -3367,7 +3372,7 @@
             </a:ln>
             <a:extLst>
               <a:ext uri="{91240B29-F687-4f45-9708-019B960494DF}">
-                <a14:hiddenLine xmlns:a14="http://schemas.microsoft.com/office/drawing/2010/main" xmlns="" w="9525">
+                <a14:hiddenLine xmlns="" xmlns:a14="http://schemas.microsoft.com/office/drawing/2010/main" w="9525">
                   <a:solidFill>
                     <a:srgbClr val="000000"/>
                   </a:solidFill>
@@ -3429,7 +3434,7 @@
             </a:ln>
             <a:extLst>
               <a:ext uri="{91240B29-F687-4f45-9708-019B960494DF}">
-                <a14:hiddenLine xmlns:a14="http://schemas.microsoft.com/office/drawing/2010/main" xmlns="" w="9525">
+                <a14:hiddenLine xmlns="" xmlns:a14="http://schemas.microsoft.com/office/drawing/2010/main" w="9525">
                   <a:solidFill>
                     <a:srgbClr val="000000"/>
                   </a:solidFill>
@@ -3519,7 +3524,7 @@
             </a:ln>
             <a:extLst>
               <a:ext uri="{91240B29-F687-4f45-9708-019B960494DF}">
-                <a14:hiddenLine xmlns:a14="http://schemas.microsoft.com/office/drawing/2010/main" xmlns="" w="9525">
+                <a14:hiddenLine xmlns="" xmlns:a14="http://schemas.microsoft.com/office/drawing/2010/main" w="9525">
                   <a:solidFill>
                     <a:srgbClr val="000000"/>
                   </a:solidFill>
@@ -3609,7 +3614,7 @@
             </a:ln>
             <a:extLst>
               <a:ext uri="{91240B29-F687-4f45-9708-019B960494DF}">
-                <a14:hiddenLine xmlns:a14="http://schemas.microsoft.com/office/drawing/2010/main" xmlns="" w="9525">
+                <a14:hiddenLine xmlns="" xmlns:a14="http://schemas.microsoft.com/office/drawing/2010/main" w="9525">
                   <a:solidFill>
                     <a:srgbClr val="000000"/>
                   </a:solidFill>
@@ -3674,7 +3679,7 @@
             </a:ln>
             <a:extLst>
               <a:ext uri="{91240B29-F687-4f45-9708-019B960494DF}">
-                <a14:hiddenLine xmlns:a14="http://schemas.microsoft.com/office/drawing/2010/main" xmlns="" w="9525">
+                <a14:hiddenLine xmlns="" xmlns:a14="http://schemas.microsoft.com/office/drawing/2010/main" w="9525">
                   <a:solidFill>
                     <a:srgbClr val="000000"/>
                   </a:solidFill>
@@ -3736,7 +3741,7 @@
             </a:ln>
             <a:extLst>
               <a:ext uri="{91240B29-F687-4f45-9708-019B960494DF}">
-                <a14:hiddenLine xmlns:a14="http://schemas.microsoft.com/office/drawing/2010/main" xmlns="" w="9525">
+                <a14:hiddenLine xmlns="" xmlns:a14="http://schemas.microsoft.com/office/drawing/2010/main" w="9525">
                   <a:solidFill>
                     <a:srgbClr val="000000"/>
                   </a:solidFill>
@@ -3826,7 +3831,7 @@
             </a:ln>
             <a:extLst>
               <a:ext uri="{91240B29-F687-4f45-9708-019B960494DF}">
-                <a14:hiddenLine xmlns:a14="http://schemas.microsoft.com/office/drawing/2010/main" xmlns="" w="9525">
+                <a14:hiddenLine xmlns="" xmlns:a14="http://schemas.microsoft.com/office/drawing/2010/main" w="9525">
                   <a:solidFill>
                     <a:srgbClr val="000000"/>
                   </a:solidFill>
@@ -3916,7 +3921,7 @@
             </a:ln>
             <a:extLst>
               <a:ext uri="{91240B29-F687-4f45-9708-019B960494DF}">
-                <a14:hiddenLine xmlns:a14="http://schemas.microsoft.com/office/drawing/2010/main" xmlns="" w="9525">
+                <a14:hiddenLine xmlns="" xmlns:a14="http://schemas.microsoft.com/office/drawing/2010/main" w="9525">
                   <a:solidFill>
                     <a:srgbClr val="000000"/>
                   </a:solidFill>
@@ -3978,7 +3983,7 @@
             </a:ln>
             <a:extLst>
               <a:ext uri="{91240B29-F687-4f45-9708-019B960494DF}">
-                <a14:hiddenLine xmlns:a14="http://schemas.microsoft.com/office/drawing/2010/main" xmlns="" w="9525">
+                <a14:hiddenLine xmlns="" xmlns:a14="http://schemas.microsoft.com/office/drawing/2010/main" w="9525">
                   <a:solidFill>
                     <a:srgbClr val="000000"/>
                   </a:solidFill>
@@ -4098,7 +4103,7 @@
             </a:ln>
             <a:extLst>
               <a:ext uri="{91240B29-F687-4f45-9708-019B960494DF}">
-                <a14:hiddenLine xmlns:a14="http://schemas.microsoft.com/office/drawing/2010/main" xmlns="" w="9525">
+                <a14:hiddenLine xmlns="" xmlns:a14="http://schemas.microsoft.com/office/drawing/2010/main" w="9525">
                   <a:solidFill>
                     <a:srgbClr val="000000"/>
                   </a:solidFill>
@@ -4166,7 +4171,7 @@
             </a:ln>
             <a:extLst>
               <a:ext uri="{91240B29-F687-4f45-9708-019B960494DF}">
-                <a14:hiddenLine xmlns:a14="http://schemas.microsoft.com/office/drawing/2010/main" xmlns="" w="9525">
+                <a14:hiddenLine xmlns="" xmlns:a14="http://schemas.microsoft.com/office/drawing/2010/main" w="9525">
                   <a:solidFill>
                     <a:srgbClr val="000000"/>
                   </a:solidFill>
@@ -4256,7 +4261,7 @@
             </a:ln>
             <a:extLst>
               <a:ext uri="{91240B29-F687-4f45-9708-019B960494DF}">
-                <a14:hiddenLine xmlns:a14="http://schemas.microsoft.com/office/drawing/2010/main" xmlns="" w="9525">
+                <a14:hiddenLine xmlns="" xmlns:a14="http://schemas.microsoft.com/office/drawing/2010/main" w="9525">
                   <a:solidFill>
                     <a:srgbClr val="000000"/>
                   </a:solidFill>
@@ -8985,7 +8990,7 @@
           <a:noFill/>
           <a:extLst>
             <a:ext uri="{909E8E84-426E-40dd-AFC4-6F175D3DCCD1}">
-              <a14:hiddenFill xmlns:a14="http://schemas.microsoft.com/office/drawing/2010/main" xmlns="">
+              <a14:hiddenFill xmlns="" xmlns:a14="http://schemas.microsoft.com/office/drawing/2010/main">
                 <a:solidFill>
                   <a:srgbClr val="FFFFFF"/>
                 </a:solidFill>
@@ -9059,7 +9064,7 @@
               </a:ln>
               <a:extLst>
                 <a:ext uri="{91240B29-F687-4f45-9708-019B960494DF}">
-                  <a14:hiddenLine xmlns:a14="http://schemas.microsoft.com/office/drawing/2010/main" xmlns="" w="9525">
+                  <a14:hiddenLine xmlns="" xmlns:a14="http://schemas.microsoft.com/office/drawing/2010/main" w="9525">
                     <a:solidFill>
                       <a:srgbClr val="000000"/>
                     </a:solidFill>
@@ -9149,7 +9154,7 @@
               </a:ln>
               <a:extLst>
                 <a:ext uri="{91240B29-F687-4f45-9708-019B960494DF}">
-                  <a14:hiddenLine xmlns:a14="http://schemas.microsoft.com/office/drawing/2010/main" xmlns="" w="9525">
+                  <a14:hiddenLine xmlns="" xmlns:a14="http://schemas.microsoft.com/office/drawing/2010/main" w="9525">
                     <a:solidFill>
                       <a:srgbClr val="000000"/>
                     </a:solidFill>
@@ -9239,7 +9244,7 @@
               </a:ln>
               <a:extLst>
                 <a:ext uri="{91240B29-F687-4f45-9708-019B960494DF}">
-                  <a14:hiddenLine xmlns:a14="http://schemas.microsoft.com/office/drawing/2010/main" xmlns="" w="9525">
+                  <a14:hiddenLine xmlns="" xmlns:a14="http://schemas.microsoft.com/office/drawing/2010/main" w="9525">
                     <a:solidFill>
                       <a:srgbClr val="000000"/>
                     </a:solidFill>
@@ -9301,7 +9306,7 @@
               </a:ln>
               <a:extLst>
                 <a:ext uri="{91240B29-F687-4f45-9708-019B960494DF}">
-                  <a14:hiddenLine xmlns:a14="http://schemas.microsoft.com/office/drawing/2010/main" xmlns="" w="9525">
+                  <a14:hiddenLine xmlns="" xmlns:a14="http://schemas.microsoft.com/office/drawing/2010/main" w="9525">
                     <a:solidFill>
                       <a:srgbClr val="000000"/>
                     </a:solidFill>
@@ -9391,7 +9396,7 @@
               </a:ln>
               <a:extLst>
                 <a:ext uri="{91240B29-F687-4f45-9708-019B960494DF}">
-                  <a14:hiddenLine xmlns:a14="http://schemas.microsoft.com/office/drawing/2010/main" xmlns="" w="9525">
+                  <a14:hiddenLine xmlns="" xmlns:a14="http://schemas.microsoft.com/office/drawing/2010/main" w="9525">
                     <a:solidFill>
                       <a:srgbClr val="000000"/>
                     </a:solidFill>
@@ -9453,7 +9458,7 @@
               </a:ln>
               <a:extLst>
                 <a:ext uri="{91240B29-F687-4f45-9708-019B960494DF}">
-                  <a14:hiddenLine xmlns:a14="http://schemas.microsoft.com/office/drawing/2010/main" xmlns="" w="9525">
+                  <a14:hiddenLine xmlns="" xmlns:a14="http://schemas.microsoft.com/office/drawing/2010/main" w="9525">
                     <a:solidFill>
                       <a:srgbClr val="000000"/>
                     </a:solidFill>
@@ -9515,7 +9520,7 @@
               </a:ln>
               <a:extLst>
                 <a:ext uri="{91240B29-F687-4f45-9708-019B960494DF}">
-                  <a14:hiddenLine xmlns:a14="http://schemas.microsoft.com/office/drawing/2010/main" xmlns="" w="9525">
+                  <a14:hiddenLine xmlns="" xmlns:a14="http://schemas.microsoft.com/office/drawing/2010/main" w="9525">
                     <a:solidFill>
                       <a:srgbClr val="000000"/>
                     </a:solidFill>
@@ -9605,7 +9610,7 @@
               </a:ln>
               <a:extLst>
                 <a:ext uri="{91240B29-F687-4f45-9708-019B960494DF}">
-                  <a14:hiddenLine xmlns:a14="http://schemas.microsoft.com/office/drawing/2010/main" xmlns="" w="9525">
+                  <a14:hiddenLine xmlns="" xmlns:a14="http://schemas.microsoft.com/office/drawing/2010/main" w="9525">
                     <a:solidFill>
                       <a:srgbClr val="000000"/>
                     </a:solidFill>
@@ -9695,7 +9700,7 @@
               </a:ln>
               <a:extLst>
                 <a:ext uri="{91240B29-F687-4f45-9708-019B960494DF}">
-                  <a14:hiddenLine xmlns:a14="http://schemas.microsoft.com/office/drawing/2010/main" xmlns="" w="9525">
+                  <a14:hiddenLine xmlns="" xmlns:a14="http://schemas.microsoft.com/office/drawing/2010/main" w="9525">
                     <a:solidFill>
                       <a:srgbClr val="000000"/>
                     </a:solidFill>
@@ -9757,7 +9762,7 @@
               </a:ln>
               <a:extLst>
                 <a:ext uri="{91240B29-F687-4f45-9708-019B960494DF}">
-                  <a14:hiddenLine xmlns:a14="http://schemas.microsoft.com/office/drawing/2010/main" xmlns="" w="9525">
+                  <a14:hiddenLine xmlns="" xmlns:a14="http://schemas.microsoft.com/office/drawing/2010/main" w="9525">
                     <a:solidFill>
                       <a:srgbClr val="000000"/>
                     </a:solidFill>
@@ -9867,7 +9872,7 @@
               </a:ln>
               <a:extLst>
                 <a:ext uri="{91240B29-F687-4f45-9708-019B960494DF}">
-                  <a14:hiddenLine xmlns:a14="http://schemas.microsoft.com/office/drawing/2010/main" xmlns="" w="9525">
+                  <a14:hiddenLine xmlns="" xmlns:a14="http://schemas.microsoft.com/office/drawing/2010/main" w="9525">
                     <a:solidFill>
                       <a:srgbClr val="000000"/>
                     </a:solidFill>
@@ -9951,7 +9956,7 @@
               </a:ln>
               <a:extLst>
                 <a:ext uri="{91240B29-F687-4f45-9708-019B960494DF}">
-                  <a14:hiddenLine xmlns:a14="http://schemas.microsoft.com/office/drawing/2010/main" xmlns="" w="9525">
+                  <a14:hiddenLine xmlns="" xmlns:a14="http://schemas.microsoft.com/office/drawing/2010/main" w="9525">
                     <a:solidFill>
                       <a:srgbClr val="000000"/>
                     </a:solidFill>
@@ -10013,7 +10018,7 @@
               </a:ln>
               <a:extLst>
                 <a:ext uri="{91240B29-F687-4f45-9708-019B960494DF}">
-                  <a14:hiddenLine xmlns:a14="http://schemas.microsoft.com/office/drawing/2010/main" xmlns="" w="9525">
+                  <a14:hiddenLine xmlns="" xmlns:a14="http://schemas.microsoft.com/office/drawing/2010/main" w="9525">
                     <a:solidFill>
                       <a:srgbClr val="000000"/>
                     </a:solidFill>
@@ -10075,7 +10080,7 @@
               </a:ln>
               <a:extLst>
                 <a:ext uri="{91240B29-F687-4f45-9708-019B960494DF}">
-                  <a14:hiddenLine xmlns:a14="http://schemas.microsoft.com/office/drawing/2010/main" xmlns="" w="9525">
+                  <a14:hiddenLine xmlns="" xmlns:a14="http://schemas.microsoft.com/office/drawing/2010/main" w="9525">
                     <a:solidFill>
                       <a:srgbClr val="000000"/>
                     </a:solidFill>
@@ -10165,7 +10170,7 @@
               </a:ln>
               <a:extLst>
                 <a:ext uri="{91240B29-F687-4f45-9708-019B960494DF}">
-                  <a14:hiddenLine xmlns:a14="http://schemas.microsoft.com/office/drawing/2010/main" xmlns="" w="9525">
+                  <a14:hiddenLine xmlns="" xmlns:a14="http://schemas.microsoft.com/office/drawing/2010/main" w="9525">
                     <a:solidFill>
                       <a:srgbClr val="000000"/>
                     </a:solidFill>
@@ -10199,7 +10204,7 @@
               </a:ln>
               <a:extLst>
                 <a:ext uri="{91240B29-F687-4f45-9708-019B960494DF}">
-                  <a14:hiddenLine xmlns:a14="http://schemas.microsoft.com/office/drawing/2010/main" xmlns="" w="9525">
+                  <a14:hiddenLine xmlns="" xmlns:a14="http://schemas.microsoft.com/office/drawing/2010/main" w="9525">
                     <a:solidFill>
                       <a:srgbClr val="000000"/>
                     </a:solidFill>
@@ -10264,7 +10269,7 @@
               </a:ln>
               <a:extLst>
                 <a:ext uri="{91240B29-F687-4f45-9708-019B960494DF}">
-                  <a14:hiddenLine xmlns:a14="http://schemas.microsoft.com/office/drawing/2010/main" xmlns="" w="9525">
+                  <a14:hiddenLine xmlns="" xmlns:a14="http://schemas.microsoft.com/office/drawing/2010/main" w="9525">
                     <a:solidFill>
                       <a:srgbClr val="000000"/>
                     </a:solidFill>
@@ -10354,7 +10359,7 @@
               </a:ln>
               <a:extLst>
                 <a:ext uri="{91240B29-F687-4f45-9708-019B960494DF}">
-                  <a14:hiddenLine xmlns:a14="http://schemas.microsoft.com/office/drawing/2010/main" xmlns="" w="9525">
+                  <a14:hiddenLine xmlns="" xmlns:a14="http://schemas.microsoft.com/office/drawing/2010/main" w="9525">
                     <a:solidFill>
                       <a:srgbClr val="000000"/>
                     </a:solidFill>
@@ -10416,7 +10421,7 @@
               </a:ln>
               <a:extLst>
                 <a:ext uri="{91240B29-F687-4f45-9708-019B960494DF}">
-                  <a14:hiddenLine xmlns:a14="http://schemas.microsoft.com/office/drawing/2010/main" xmlns="" w="9525">
+                  <a14:hiddenLine xmlns="" xmlns:a14="http://schemas.microsoft.com/office/drawing/2010/main" w="9525">
                     <a:solidFill>
                       <a:srgbClr val="000000"/>
                     </a:solidFill>
@@ -10506,7 +10511,7 @@
               </a:ln>
               <a:extLst>
                 <a:ext uri="{91240B29-F687-4f45-9708-019B960494DF}">
-                  <a14:hiddenLine xmlns:a14="http://schemas.microsoft.com/office/drawing/2010/main" xmlns="" w="9525">
+                  <a14:hiddenLine xmlns="" xmlns:a14="http://schemas.microsoft.com/office/drawing/2010/main" w="9525">
                     <a:solidFill>
                       <a:srgbClr val="000000"/>
                     </a:solidFill>
@@ -10571,7 +10576,7 @@
               </a:ln>
               <a:extLst>
                 <a:ext uri="{91240B29-F687-4f45-9708-019B960494DF}">
-                  <a14:hiddenLine xmlns:a14="http://schemas.microsoft.com/office/drawing/2010/main" xmlns="" w="9525">
+                  <a14:hiddenLine xmlns="" xmlns:a14="http://schemas.microsoft.com/office/drawing/2010/main" w="9525">
                     <a:solidFill>
                       <a:srgbClr val="000000"/>
                     </a:solidFill>
@@ -10633,7 +10638,7 @@
               </a:ln>
               <a:extLst>
                 <a:ext uri="{91240B29-F687-4f45-9708-019B960494DF}">
-                  <a14:hiddenLine xmlns:a14="http://schemas.microsoft.com/office/drawing/2010/main" xmlns="" w="9525">
+                  <a14:hiddenLine xmlns="" xmlns:a14="http://schemas.microsoft.com/office/drawing/2010/main" w="9525">
                     <a:solidFill>
                       <a:srgbClr val="000000"/>
                     </a:solidFill>
@@ -10723,7 +10728,7 @@
               </a:ln>
               <a:extLst>
                 <a:ext uri="{91240B29-F687-4f45-9708-019B960494DF}">
-                  <a14:hiddenLine xmlns:a14="http://schemas.microsoft.com/office/drawing/2010/main" xmlns="" w="9525">
+                  <a14:hiddenLine xmlns="" xmlns:a14="http://schemas.microsoft.com/office/drawing/2010/main" w="9525">
                     <a:solidFill>
                       <a:srgbClr val="000000"/>
                     </a:solidFill>
@@ -10813,7 +10818,7 @@
               </a:ln>
               <a:extLst>
                 <a:ext uri="{91240B29-F687-4f45-9708-019B960494DF}">
-                  <a14:hiddenLine xmlns:a14="http://schemas.microsoft.com/office/drawing/2010/main" xmlns="" w="9525">
+                  <a14:hiddenLine xmlns="" xmlns:a14="http://schemas.microsoft.com/office/drawing/2010/main" w="9525">
                     <a:solidFill>
                       <a:srgbClr val="000000"/>
                     </a:solidFill>
@@ -10878,7 +10883,7 @@
               </a:ln>
               <a:extLst>
                 <a:ext uri="{91240B29-F687-4f45-9708-019B960494DF}">
-                  <a14:hiddenLine xmlns:a14="http://schemas.microsoft.com/office/drawing/2010/main" xmlns="" w="9525">
+                  <a14:hiddenLine xmlns="" xmlns:a14="http://schemas.microsoft.com/office/drawing/2010/main" w="9525">
                     <a:solidFill>
                       <a:srgbClr val="000000"/>
                     </a:solidFill>
@@ -10998,7 +11003,7 @@
               </a:ln>
               <a:extLst>
                 <a:ext uri="{91240B29-F687-4f45-9708-019B960494DF}">
-                  <a14:hiddenLine xmlns:a14="http://schemas.microsoft.com/office/drawing/2010/main" xmlns="" w="9525">
+                  <a14:hiddenLine xmlns="" xmlns:a14="http://schemas.microsoft.com/office/drawing/2010/main" w="9525">
                     <a:solidFill>
                       <a:srgbClr val="000000"/>
                     </a:solidFill>
@@ -11079,7 +11084,7 @@
               </a:ln>
               <a:extLst>
                 <a:ext uri="{91240B29-F687-4f45-9708-019B960494DF}">
-                  <a14:hiddenLine xmlns:a14="http://schemas.microsoft.com/office/drawing/2010/main" xmlns="" w="9525">
+                  <a14:hiddenLine xmlns="" xmlns:a14="http://schemas.microsoft.com/office/drawing/2010/main" w="9525">
                     <a:solidFill>
                       <a:srgbClr val="000000"/>
                     </a:solidFill>
@@ -11194,7 +11199,7 @@
               </a:ln>
               <a:extLst>
                 <a:ext uri="{91240B29-F687-4f45-9708-019B960494DF}">
-                  <a14:hiddenLine xmlns:a14="http://schemas.microsoft.com/office/drawing/2010/main" xmlns="" w="9525">
+                  <a14:hiddenLine xmlns="" xmlns:a14="http://schemas.microsoft.com/office/drawing/2010/main" w="9525">
                     <a:solidFill>
                       <a:srgbClr val="000000"/>
                     </a:solidFill>
@@ -11284,7 +11289,7 @@
               </a:ln>
               <a:extLst>
                 <a:ext uri="{91240B29-F687-4f45-9708-019B960494DF}">
-                  <a14:hiddenLine xmlns:a14="http://schemas.microsoft.com/office/drawing/2010/main" xmlns="" w="9525">
+                  <a14:hiddenLine xmlns="" xmlns:a14="http://schemas.microsoft.com/office/drawing/2010/main" w="9525">
                     <a:solidFill>
                       <a:srgbClr val="000000"/>
                     </a:solidFill>
@@ -11349,7 +11354,7 @@
               </a:ln>
               <a:extLst>
                 <a:ext uri="{91240B29-F687-4f45-9708-019B960494DF}">
-                  <a14:hiddenLine xmlns:a14="http://schemas.microsoft.com/office/drawing/2010/main" xmlns="" w="9525">
+                  <a14:hiddenLine xmlns="" xmlns:a14="http://schemas.microsoft.com/office/drawing/2010/main" w="9525">
                     <a:solidFill>
                       <a:srgbClr val="000000"/>
                     </a:solidFill>
@@ -11439,7 +11444,7 @@
               </a:ln>
               <a:extLst>
                 <a:ext uri="{91240B29-F687-4f45-9708-019B960494DF}">
-                  <a14:hiddenLine xmlns:a14="http://schemas.microsoft.com/office/drawing/2010/main" xmlns="" w="9525">
+                  <a14:hiddenLine xmlns="" xmlns:a14="http://schemas.microsoft.com/office/drawing/2010/main" w="9525">
                     <a:solidFill>
                       <a:srgbClr val="000000"/>
                     </a:solidFill>
@@ -11507,7 +11512,7 @@
               </a:ln>
               <a:extLst>
                 <a:ext uri="{91240B29-F687-4f45-9708-019B960494DF}">
-                  <a14:hiddenLine xmlns:a14="http://schemas.microsoft.com/office/drawing/2010/main" xmlns="" w="9525">
+                  <a14:hiddenLine xmlns="" xmlns:a14="http://schemas.microsoft.com/office/drawing/2010/main" w="9525">
                     <a:solidFill>
                       <a:srgbClr val="000000"/>
                     </a:solidFill>
@@ -11597,7 +11602,7 @@
               </a:ln>
               <a:extLst>
                 <a:ext uri="{91240B29-F687-4f45-9708-019B960494DF}">
-                  <a14:hiddenLine xmlns:a14="http://schemas.microsoft.com/office/drawing/2010/main" xmlns="" w="9525">
+                  <a14:hiddenLine xmlns="" xmlns:a14="http://schemas.microsoft.com/office/drawing/2010/main" w="9525">
                     <a:solidFill>
                       <a:srgbClr val="000000"/>
                     </a:solidFill>
@@ -11665,7 +11670,7 @@
               </a:ln>
               <a:extLst>
                 <a:ext uri="{91240B29-F687-4f45-9708-019B960494DF}">
-                  <a14:hiddenLine xmlns:a14="http://schemas.microsoft.com/office/drawing/2010/main" xmlns="" w="9525">
+                  <a14:hiddenLine xmlns="" xmlns:a14="http://schemas.microsoft.com/office/drawing/2010/main" w="9525">
                     <a:solidFill>
                       <a:srgbClr val="000000"/>
                     </a:solidFill>
@@ -11755,7 +11760,7 @@
               </a:ln>
               <a:extLst>
                 <a:ext uri="{91240B29-F687-4f45-9708-019B960494DF}">
-                  <a14:hiddenLine xmlns:a14="http://schemas.microsoft.com/office/drawing/2010/main" xmlns="" w="9525">
+                  <a14:hiddenLine xmlns="" xmlns:a14="http://schemas.microsoft.com/office/drawing/2010/main" w="9525">
                     <a:solidFill>
                       <a:srgbClr val="000000"/>
                     </a:solidFill>
@@ -11789,7 +11794,7 @@
               </a:ln>
               <a:extLst>
                 <a:ext uri="{91240B29-F687-4f45-9708-019B960494DF}">
-                  <a14:hiddenLine xmlns:a14="http://schemas.microsoft.com/office/drawing/2010/main" xmlns="" w="9525">
+                  <a14:hiddenLine xmlns="" xmlns:a14="http://schemas.microsoft.com/office/drawing/2010/main" w="9525">
                     <a:solidFill>
                       <a:srgbClr val="000000"/>
                     </a:solidFill>
@@ -12332,6 +12337,11 @@
 <file path=ppt/slides/slide1.xml><?xml version="1.0" encoding="utf-8"?>
 <p:sld xmlns:a="http://schemas.openxmlformats.org/drawingml/2006/main" xmlns:r="http://schemas.openxmlformats.org/officeDocument/2006/relationships" xmlns:p="http://schemas.openxmlformats.org/presentationml/2006/main">
   <p:cSld>
+    <p:bg>
+      <p:bgRef idx="1003">
+        <a:schemeClr val="bg2"/>
+      </p:bgRef>
+    </p:bg>
     <p:spTree>
       <p:nvGrpSpPr>
         <p:cNvPr id="1" name=""/>
@@ -12364,17 +12374,26 @@
         </p:nvSpPr>
         <p:spPr>
           <a:xfrm>
-            <a:off x="2808581" y="1143893"/>
-            <a:ext cx="7214310" cy="839602"/>
+            <a:off x="2702050" y="824297"/>
+            <a:ext cx="7214310" cy="1803493"/>
           </a:xfrm>
         </p:spPr>
         <p:txBody>
-          <a:bodyPr/>
+          <a:bodyPr>
+            <a:normAutofit fontScale="90000"/>
+          </a:bodyPr>
           <a:lstStyle/>
           <a:p>
             <a:r>
               <a:rPr lang="es-CO" dirty="0"/>
-              <a:t>Servidor web Esp8266</a:t>
+              <a:t>Monitorización de temperatura y humedad</a:t>
+            </a:r>
+            <a:br>
+              <a:rPr lang="es-CO" dirty="0"/>
+            </a:br>
+            <a:r>
+              <a:rPr lang="es-CO" dirty="0"/>
+              <a:t>con Servidor web Esp8266</a:t>
             </a:r>
           </a:p>
         </p:txBody>
@@ -12439,7 +12458,7 @@
           <p:nvPr/>
         </p:nvPicPr>
         <p:blipFill>
-          <a:blip r:embed="rId2">
+          <a:blip r:embed="rId3">
             <a:extLst>
               <a:ext uri="{28A0092B-C50C-407E-A947-70E740481C1C}">
                 <a14:useLocalDpi xmlns:a14="http://schemas.microsoft.com/office/drawing/2010/main" val="0"/>
@@ -12479,7 +12498,7 @@
     </p:extLst>
   </p:cSld>
   <p:clrMapOvr>
-    <a:masterClrMapping/>
+    <a:overrideClrMapping bg1="dk1" tx1="lt1" bg2="dk2" tx2="lt2" accent1="accent1" accent2="accent2" accent3="accent3" accent4="accent4" accent5="accent5" accent6="accent6" hlink="hlink" folHlink="folHlink"/>
   </p:clrMapOvr>
 </p:sld>
 </file>
@@ -12705,7 +12724,7 @@
         </p:nvSpPr>
         <p:spPr>
           <a:xfrm>
-            <a:off x="754450" y="1977644"/>
+            <a:off x="754450" y="1732969"/>
             <a:ext cx="4683824" cy="1685077"/>
           </a:xfrm>
         </p:spPr>
@@ -12771,7 +12790,7 @@
         </p:blipFill>
         <p:spPr>
           <a:xfrm>
-            <a:off x="754450" y="3662721"/>
+            <a:off x="754450" y="4417323"/>
             <a:ext cx="5144114" cy="2071377"/>
           </a:xfrm>
           <a:prstGeom prst="rect">
@@ -12779,6 +12798,214 @@
           </a:prstGeom>
         </p:spPr>
       </p:pic>
+      <p:sp>
+        <p:nvSpPr>
+          <p:cNvPr id="6" name="Marcador de contenido 2">
+            <a:extLst>
+              <a:ext uri="{FF2B5EF4-FFF2-40B4-BE49-F238E27FC236}">
+                <a16:creationId xmlns:a16="http://schemas.microsoft.com/office/drawing/2014/main" id="{52FF328D-7F7C-4C4B-AC31-9E5FD8E10E50}"/>
+              </a:ext>
+            </a:extLst>
+          </p:cNvPr>
+          <p:cNvSpPr txBox="1">
+            <a:spLocks/>
+          </p:cNvSpPr>
+          <p:nvPr/>
+        </p:nvSpPr>
+        <p:spPr>
+          <a:xfrm>
+            <a:off x="754450" y="3092025"/>
+            <a:ext cx="4683824" cy="1685077"/>
+          </a:xfrm>
+          <a:prstGeom prst="rect">
+            <a:avLst/>
+          </a:prstGeom>
+        </p:spPr>
+        <p:txBody>
+          <a:bodyPr vert="horz" lIns="91440" tIns="45720" rIns="91440" bIns="45720" rtlCol="0">
+            <a:normAutofit/>
+          </a:bodyPr>
+          <a:lstStyle>
+            <a:lvl1pPr marL="228600" indent="-228600" algn="l" defTabSz="914400" rtl="0" eaLnBrk="1" latinLnBrk="0" hangingPunct="1">
+              <a:lnSpc>
+                <a:spcPct val="120000"/>
+              </a:lnSpc>
+              <a:spcBef>
+                <a:spcPts val="1000"/>
+              </a:spcBef>
+              <a:buSzPct val="125000"/>
+              <a:buFont typeface="Arial" panose="020B0604020202020204" pitchFamily="34" charset="0"/>
+              <a:buChar char="•"/>
+              <a:defRPr sz="2400" kern="1200">
+                <a:solidFill>
+                  <a:schemeClr val="tx1"/>
+                </a:solidFill>
+                <a:latin typeface="+mn-lt"/>
+                <a:ea typeface="+mn-ea"/>
+                <a:cs typeface="+mn-cs"/>
+              </a:defRPr>
+            </a:lvl1pPr>
+            <a:lvl2pPr marL="685800" indent="-228600" algn="l" defTabSz="914400" rtl="0" eaLnBrk="1" latinLnBrk="0" hangingPunct="1">
+              <a:lnSpc>
+                <a:spcPct val="120000"/>
+              </a:lnSpc>
+              <a:spcBef>
+                <a:spcPts val="500"/>
+              </a:spcBef>
+              <a:buSzPct val="125000"/>
+              <a:buFont typeface="Arial" panose="020B0604020202020204" pitchFamily="34" charset="0"/>
+              <a:buChar char="•"/>
+              <a:defRPr sz="2000" kern="1200">
+                <a:solidFill>
+                  <a:schemeClr val="tx1"/>
+                </a:solidFill>
+                <a:latin typeface="+mn-lt"/>
+                <a:ea typeface="+mn-ea"/>
+                <a:cs typeface="+mn-cs"/>
+              </a:defRPr>
+            </a:lvl2pPr>
+            <a:lvl3pPr marL="1143000" indent="-228600" algn="l" defTabSz="914400" rtl="0" eaLnBrk="1" latinLnBrk="0" hangingPunct="1">
+              <a:lnSpc>
+                <a:spcPct val="120000"/>
+              </a:lnSpc>
+              <a:spcBef>
+                <a:spcPts val="500"/>
+              </a:spcBef>
+              <a:buSzPct val="125000"/>
+              <a:buFont typeface="Arial" panose="020B0604020202020204" pitchFamily="34" charset="0"/>
+              <a:buChar char="•"/>
+              <a:defRPr sz="1800" kern="1200">
+                <a:solidFill>
+                  <a:schemeClr val="tx1"/>
+                </a:solidFill>
+                <a:latin typeface="+mn-lt"/>
+                <a:ea typeface="+mn-ea"/>
+                <a:cs typeface="+mn-cs"/>
+              </a:defRPr>
+            </a:lvl3pPr>
+            <a:lvl4pPr marL="1600200" indent="-228600" algn="l" defTabSz="914400" rtl="0" eaLnBrk="1" latinLnBrk="0" hangingPunct="1">
+              <a:lnSpc>
+                <a:spcPct val="120000"/>
+              </a:lnSpc>
+              <a:spcBef>
+                <a:spcPts val="500"/>
+              </a:spcBef>
+              <a:buSzPct val="125000"/>
+              <a:buFont typeface="Arial" panose="020B0604020202020204" pitchFamily="34" charset="0"/>
+              <a:buChar char="•"/>
+              <a:defRPr sz="1600" kern="1200">
+                <a:solidFill>
+                  <a:schemeClr val="tx1"/>
+                </a:solidFill>
+                <a:latin typeface="+mn-lt"/>
+                <a:ea typeface="+mn-ea"/>
+                <a:cs typeface="+mn-cs"/>
+              </a:defRPr>
+            </a:lvl4pPr>
+            <a:lvl5pPr marL="2057400" indent="-228600" algn="l" defTabSz="914400" rtl="0" eaLnBrk="1" latinLnBrk="0" hangingPunct="1">
+              <a:lnSpc>
+                <a:spcPct val="120000"/>
+              </a:lnSpc>
+              <a:spcBef>
+                <a:spcPts val="500"/>
+              </a:spcBef>
+              <a:buSzPct val="125000"/>
+              <a:buFont typeface="Arial" panose="020B0604020202020204" pitchFamily="34" charset="0"/>
+              <a:buChar char="•"/>
+              <a:defRPr sz="1600" kern="1200">
+                <a:solidFill>
+                  <a:schemeClr val="tx1"/>
+                </a:solidFill>
+                <a:latin typeface="+mn-lt"/>
+                <a:ea typeface="+mn-ea"/>
+                <a:cs typeface="+mn-cs"/>
+              </a:defRPr>
+            </a:lvl5pPr>
+            <a:lvl6pPr marL="2514600" indent="-228600" algn="l" defTabSz="914400" rtl="0" eaLnBrk="1" latinLnBrk="0" hangingPunct="1">
+              <a:lnSpc>
+                <a:spcPct val="120000"/>
+              </a:lnSpc>
+              <a:spcBef>
+                <a:spcPts val="500"/>
+              </a:spcBef>
+              <a:buSzPct val="125000"/>
+              <a:buFont typeface="Arial" panose="020B0604020202020204" pitchFamily="34" charset="0"/>
+              <a:buChar char="•"/>
+              <a:defRPr sz="1400" kern="1200">
+                <a:solidFill>
+                  <a:schemeClr val="tx1"/>
+                </a:solidFill>
+                <a:latin typeface="+mn-lt"/>
+                <a:ea typeface="+mn-ea"/>
+                <a:cs typeface="+mn-cs"/>
+              </a:defRPr>
+            </a:lvl6pPr>
+            <a:lvl7pPr marL="2971800" indent="-228600" algn="l" defTabSz="914400" rtl="0" eaLnBrk="1" latinLnBrk="0" hangingPunct="1">
+              <a:lnSpc>
+                <a:spcPct val="120000"/>
+              </a:lnSpc>
+              <a:spcBef>
+                <a:spcPts val="500"/>
+              </a:spcBef>
+              <a:buSzPct val="125000"/>
+              <a:buFont typeface="Arial" panose="020B0604020202020204" pitchFamily="34" charset="0"/>
+              <a:buChar char="•"/>
+              <a:defRPr sz="1400" kern="1200">
+                <a:solidFill>
+                  <a:schemeClr val="tx1"/>
+                </a:solidFill>
+                <a:latin typeface="+mn-lt"/>
+                <a:ea typeface="+mn-ea"/>
+                <a:cs typeface="+mn-cs"/>
+              </a:defRPr>
+            </a:lvl7pPr>
+            <a:lvl8pPr marL="3429000" indent="-228600" algn="l" defTabSz="914400" rtl="0" eaLnBrk="1" latinLnBrk="0" hangingPunct="1">
+              <a:lnSpc>
+                <a:spcPct val="120000"/>
+              </a:lnSpc>
+              <a:spcBef>
+                <a:spcPts val="500"/>
+              </a:spcBef>
+              <a:buSzPct val="125000"/>
+              <a:buFont typeface="Arial" panose="020B0604020202020204" pitchFamily="34" charset="0"/>
+              <a:buChar char="•"/>
+              <a:defRPr sz="1400" kern="1200">
+                <a:solidFill>
+                  <a:schemeClr val="tx1"/>
+                </a:solidFill>
+                <a:latin typeface="+mn-lt"/>
+                <a:ea typeface="+mn-ea"/>
+                <a:cs typeface="+mn-cs"/>
+              </a:defRPr>
+            </a:lvl8pPr>
+            <a:lvl9pPr marL="3886200" indent="-228600" algn="l" defTabSz="914400" rtl="0" eaLnBrk="1" latinLnBrk="0" hangingPunct="1">
+              <a:lnSpc>
+                <a:spcPct val="120000"/>
+              </a:lnSpc>
+              <a:spcBef>
+                <a:spcPts val="500"/>
+              </a:spcBef>
+              <a:buSzPct val="125000"/>
+              <a:buFont typeface="Arial" panose="020B0604020202020204" pitchFamily="34" charset="0"/>
+              <a:buChar char="•"/>
+              <a:defRPr sz="1400" kern="1200">
+                <a:solidFill>
+                  <a:schemeClr val="tx1"/>
+                </a:solidFill>
+                <a:latin typeface="+mn-lt"/>
+                <a:ea typeface="+mn-ea"/>
+                <a:cs typeface="+mn-cs"/>
+              </a:defRPr>
+            </a:lvl9pPr>
+          </a:lstStyle>
+          <a:p>
+            <a:r>
+              <a:rPr lang="es-CO" dirty="0"/>
+              <a:t>Ya posee conversor de analógico a digital</a:t>
+            </a:r>
+          </a:p>
+        </p:txBody>
+      </p:sp>
     </p:spTree>
     <p:extLst>
       <p:ext uri="{BB962C8B-B14F-4D97-AF65-F5344CB8AC3E}">
@@ -13856,4 +14083,47 @@
     </a:ext>
   </a:extLst>
 </a:theme>
+</file>
+
+<file path=ppt/theme/themeOverride1.xml><?xml version="1.0" encoding="utf-8"?>
+<a:themeOverride xmlns:a="http://schemas.openxmlformats.org/drawingml/2006/main">
+  <a:clrScheme name="Circuit">
+    <a:dk1>
+      <a:sysClr val="windowText" lastClr="000000"/>
+    </a:dk1>
+    <a:lt1>
+      <a:sysClr val="window" lastClr="FFFFFF"/>
+    </a:lt1>
+    <a:dk2>
+      <a:srgbClr val="252C36"/>
+    </a:dk2>
+    <a:lt2>
+      <a:srgbClr val="7C96A3"/>
+    </a:lt2>
+    <a:accent1>
+      <a:srgbClr val="4FD093"/>
+    </a:accent1>
+    <a:accent2>
+      <a:srgbClr val="54BCDF"/>
+    </a:accent2>
+    <a:accent3>
+      <a:srgbClr val="A262D0"/>
+    </a:accent3>
+    <a:accent4>
+      <a:srgbClr val="D7537B"/>
+    </a:accent4>
+    <a:accent5>
+      <a:srgbClr val="E78045"/>
+    </a:accent5>
+    <a:accent6>
+      <a:srgbClr val="84C350"/>
+    </a:accent6>
+    <a:hlink>
+      <a:srgbClr val="22FFFF"/>
+    </a:hlink>
+    <a:folHlink>
+      <a:srgbClr val="9BF3FD"/>
+    </a:folHlink>
+  </a:clrScheme>
+</a:themeOverride>
 </file>
</xml_diff>